<commit_message>
add readme & requirement.txt
</commit_message>
<xml_diff>
--- a/report/Analyzing Job Market Trends for Data Scientists.pptx
+++ b/report/Analyzing Job Market Trends for Data Scientists.pptx
@@ -3251,7 +3251,7 @@
           <a:p>
             <a:fld id="{3F00BCFC-AFFD-334C-A183-6116BAFDF92B}" type="datetimeFigureOut">
               <a:rPr lang="en-US" smtClean="0"/>
-              <a:t>4/15/2025</a:t>
+              <a:t>4/16/2025</a:t>
             </a:fld>
             <a:endParaRPr lang="en-US" dirty="0"/>
           </a:p>
@@ -23390,15 +23390,6 @@
 </file>
 
 <file path=customXml/item1.xml><?xml version="1.0" encoding="utf-8"?>
-<?mso-contentType ?>
-<FormTemplates xmlns="http://schemas.microsoft.com/sharepoint/v3/contenttype/forms">
-  <Display>DocumentLibraryForm</Display>
-  <Edit>DocumentLibraryForm</Edit>
-  <New>DocumentLibraryForm</New>
-</FormTemplates>
-</file>
-
-<file path=customXml/item2.xml><?xml version="1.0" encoding="utf-8"?>
 <p:properties xmlns:p="http://schemas.microsoft.com/office/2006/metadata/properties" xmlns:xsi="http://www.w3.org/2001/XMLSchema-instance" xmlns:pc="http://schemas.microsoft.com/office/infopath/2007/PartnerControls">
   <documentManagement>
     <_ip_UnifiedCompliancePolicyUIAction xmlns="http://schemas.microsoft.com/sharepoint/v3" xsi:nil="true"/>
@@ -23416,6 +23407,15 @@
     <MediaServiceKeyPoints xmlns="71af3243-3dd4-4a8d-8c0d-dd76da1f02a5" xsi:nil="true"/>
   </documentManagement>
 </p:properties>
+</file>
+
+<file path=customXml/item2.xml><?xml version="1.0" encoding="utf-8"?>
+<?mso-contentType ?>
+<FormTemplates xmlns="http://schemas.microsoft.com/sharepoint/v3/contenttype/forms">
+  <Display>DocumentLibraryForm</Display>
+  <Edit>DocumentLibraryForm</Edit>
+  <New>DocumentLibraryForm</New>
+</FormTemplates>
 </file>
 
 <file path=customXml/item3.xml><?xml version="1.0" encoding="utf-8"?>
@@ -23713,14 +23713,6 @@
 </file>
 
 <file path=customXml/itemProps1.xml><?xml version="1.0" encoding="utf-8"?>
-<ds:datastoreItem xmlns:ds="http://schemas.openxmlformats.org/officeDocument/2006/customXml" ds:itemID="{4F1F1912-3146-44AF-A389-9E8B77BB3688}">
-  <ds:schemaRefs>
-    <ds:schemaRef ds:uri="http://schemas.microsoft.com/sharepoint/v3/contenttype/forms"/>
-  </ds:schemaRefs>
-</ds:datastoreItem>
-</file>
-
-<file path=customXml/itemProps2.xml><?xml version="1.0" encoding="utf-8"?>
 <ds:datastoreItem xmlns:ds="http://schemas.openxmlformats.org/officeDocument/2006/customXml" ds:itemID="{F8B8ECF1-2A9D-464C-AFE8-2B3295D0BF97}">
   <ds:schemaRefs>
     <ds:schemaRef ds:uri="http://schemas.microsoft.com/office/2006/metadata/properties"/>
@@ -23728,6 +23720,14 @@
     <ds:schemaRef ds:uri="http://schemas.microsoft.com/sharepoint/v3"/>
     <ds:schemaRef ds:uri="71af3243-3dd4-4a8d-8c0d-dd76da1f02a5"/>
     <ds:schemaRef ds:uri="230e9df3-be65-4c73-a93b-d1236ebd677e"/>
+  </ds:schemaRefs>
+</ds:datastoreItem>
+</file>
+
+<file path=customXml/itemProps2.xml><?xml version="1.0" encoding="utf-8"?>
+<ds:datastoreItem xmlns:ds="http://schemas.openxmlformats.org/officeDocument/2006/customXml" ds:itemID="{4F1F1912-3146-44AF-A389-9E8B77BB3688}">
+  <ds:schemaRefs>
+    <ds:schemaRef ds:uri="http://schemas.microsoft.com/sharepoint/v3/contenttype/forms"/>
   </ds:schemaRefs>
 </ds:datastoreItem>
 </file>

</xml_diff>